<commit_message>
Update Week 9 Lecture 1 -Biquad Realization.pptx
</commit_message>
<xml_diff>
--- a/PP WORK/Instructor Version/Week 9/Week 9 Lecture 1 -Biquad Realization.pptx
+++ b/PP WORK/Instructor Version/Week 9/Week 9 Lecture 1 -Biquad Realization.pptx
@@ -121,7 +121,7 @@
   </p:defaultTextStyle>
   <p:extLst>
     <p:ext uri="{EFAFB233-063F-42B5-8137-9DF3F51BA10A}">
-      <p15:sldGuideLst xmlns:p15="http://schemas.microsoft.com/office/powerpoint/2012/main">
+      <p15:sldGuideLst xmlns:p15="http://schemas.microsoft.com/office/powerpoint/2012/main" xmlns="">
         <p15:guide id="1" orient="horz" pos="2160" userDrawn="1">
           <p15:clr>
             <a:srgbClr val="A4A3A4"/>
@@ -220,7 +220,7 @@
           <a:p>
             <a:fld id="{18AB4343-410D-4114-8175-E2D7C9308D80}" type="datetimeFigureOut">
               <a:rPr lang="en-US" smtClean="0"/>
-              <a:t>11/19/2024</a:t>
+              <a:t>1/14/2025</a:t>
             </a:fld>
             <a:endParaRPr lang="en-US"/>
           </a:p>
@@ -918,7 +918,7 @@
           <a:p>
             <a:fld id="{1D8BD707-D9CF-40AE-B4C6-C98DA3205C09}" type="datetimeFigureOut">
               <a:rPr lang="en-US"/>
-              <a:t>11/19/2024</a:t>
+              <a:t>1/14/2025</a:t>
             </a:fld>
             <a:endParaRPr lang="en-US"/>
           </a:p>
@@ -1088,7 +1088,7 @@
           <a:p>
             <a:fld id="{1D8BD707-D9CF-40AE-B4C6-C98DA3205C09}" type="datetimeFigureOut">
               <a:rPr lang="en-US"/>
-              <a:t>11/19/2024</a:t>
+              <a:t>1/14/2025</a:t>
             </a:fld>
             <a:endParaRPr lang="en-US"/>
           </a:p>
@@ -1301,7 +1301,7 @@
           <a:p>
             <a:fld id="{1D8BD707-D9CF-40AE-B4C6-C98DA3205C09}" type="datetimeFigureOut">
               <a:rPr lang="en-US"/>
-              <a:t>11/19/2024</a:t>
+              <a:t>1/14/2025</a:t>
             </a:fld>
             <a:endParaRPr lang="en-US"/>
           </a:p>
@@ -1448,7 +1448,7 @@
           <a:p>
             <a:fld id="{1D8BD707-D9CF-40AE-B4C6-C98DA3205C09}" type="datetimeFigureOut">
               <a:rPr lang="en-US"/>
-              <a:t>11/19/2024</a:t>
+              <a:t>1/14/2025</a:t>
             </a:fld>
             <a:endParaRPr lang="en-US"/>
           </a:p>
@@ -1521,7 +1521,7 @@
           <p:cNvPr id="2" name="Title 1">
             <a:extLst>
               <a:ext uri="{FF2B5EF4-FFF2-40B4-BE49-F238E27FC236}">
-                <a16:creationId xmlns:a16="http://schemas.microsoft.com/office/drawing/2014/main" id="{8267C4E5-55F7-DB05-186B-06791E1D1784}"/>
+                <a16:creationId xmlns:a16="http://schemas.microsoft.com/office/drawing/2014/main" xmlns="" id="{8267C4E5-55F7-DB05-186B-06791E1D1784}"/>
               </a:ext>
             </a:extLst>
           </p:cNvPr>
@@ -1550,7 +1550,7 @@
           <p:cNvPr id="3" name="Footer Placeholder 2">
             <a:extLst>
               <a:ext uri="{FF2B5EF4-FFF2-40B4-BE49-F238E27FC236}">
-                <a16:creationId xmlns:a16="http://schemas.microsoft.com/office/drawing/2014/main" id="{B3AA35ED-DF99-6958-28FA-33A93BB97722}"/>
+                <a16:creationId xmlns:a16="http://schemas.microsoft.com/office/drawing/2014/main" xmlns="" id="{B3AA35ED-DF99-6958-28FA-33A93BB97722}"/>
               </a:ext>
             </a:extLst>
           </p:cNvPr>
@@ -1575,7 +1575,7 @@
           <p:cNvPr id="4" name="Date Placeholder 3">
             <a:extLst>
               <a:ext uri="{FF2B5EF4-FFF2-40B4-BE49-F238E27FC236}">
-                <a16:creationId xmlns:a16="http://schemas.microsoft.com/office/drawing/2014/main" id="{55503DB0-5264-6061-D4B6-AE3D944FC839}"/>
+                <a16:creationId xmlns:a16="http://schemas.microsoft.com/office/drawing/2014/main" xmlns="" id="{55503DB0-5264-6061-D4B6-AE3D944FC839}"/>
               </a:ext>
             </a:extLst>
           </p:cNvPr>
@@ -1593,7 +1593,7 @@
           <a:p>
             <a:fld id="{1D8BD707-D9CF-40AE-B4C6-C98DA3205C09}" type="datetimeFigureOut">
               <a:rPr lang="en-US" smtClean="0"/>
-              <a:t>11/19/2024</a:t>
+              <a:t>1/14/2025</a:t>
             </a:fld>
             <a:endParaRPr lang="en-US"/>
           </a:p>
@@ -1604,7 +1604,7 @@
           <p:cNvPr id="5" name="Slide Number Placeholder 4">
             <a:extLst>
               <a:ext uri="{FF2B5EF4-FFF2-40B4-BE49-F238E27FC236}">
-                <a16:creationId xmlns:a16="http://schemas.microsoft.com/office/drawing/2014/main" id="{306C615E-9D94-7E15-4EC3-69D6111D00EE}"/>
+                <a16:creationId xmlns:a16="http://schemas.microsoft.com/office/drawing/2014/main" xmlns="" id="{306C615E-9D94-7E15-4EC3-69D6111D00EE}"/>
               </a:ext>
             </a:extLst>
           </p:cNvPr>
@@ -1714,7 +1714,7 @@
           <a:p>
             <a:fld id="{1D8BD707-D9CF-40AE-B4C6-C98DA3205C09}" type="datetimeFigureOut">
               <a:rPr lang="en-US"/>
-              <a:t>11/19/2024</a:t>
+              <a:t>1/14/2025</a:t>
             </a:fld>
             <a:endParaRPr lang="en-US"/>
           </a:p>
@@ -1787,7 +1787,7 @@
           <p:cNvPr id="25" name="Rectangle 24">
             <a:extLst>
               <a:ext uri="{FF2B5EF4-FFF2-40B4-BE49-F238E27FC236}">
-                <a16:creationId xmlns:a16="http://schemas.microsoft.com/office/drawing/2014/main" id="{669E0535-6FD9-4D8F-80CA-FF7A96DB665F}"/>
+                <a16:creationId xmlns:a16="http://schemas.microsoft.com/office/drawing/2014/main" xmlns="" id="{669E0535-6FD9-4D8F-80CA-FF7A96DB665F}"/>
               </a:ext>
             </a:extLst>
           </p:cNvPr>
@@ -1830,7 +1830,7 @@
           <a:lstStyle/>
           <a:p>
             <a:pPr algn="ctr"/>
-            <a:endParaRPr lang="en-KW" sz="2400"/>
+            <a:endParaRPr lang="x-none" sz="2400"/>
           </a:p>
         </p:txBody>
       </p:sp>
@@ -1839,7 +1839,7 @@
           <p:cNvPr id="26" name="Picture 25" descr="A black and red background with a bird&#10;&#10;Description automatically generated">
             <a:extLst>
               <a:ext uri="{FF2B5EF4-FFF2-40B4-BE49-F238E27FC236}">
-                <a16:creationId xmlns:a16="http://schemas.microsoft.com/office/drawing/2014/main" id="{7356EFA9-D406-4147-B1F7-82B217840839}"/>
+                <a16:creationId xmlns:a16="http://schemas.microsoft.com/office/drawing/2014/main" xmlns="" id="{7356EFA9-D406-4147-B1F7-82B217840839}"/>
               </a:ext>
             </a:extLst>
           </p:cNvPr>
@@ -1869,7 +1869,7 @@
           <p:cNvPr id="27" name="Google Shape;15;p13">
             <a:extLst>
               <a:ext uri="{FF2B5EF4-FFF2-40B4-BE49-F238E27FC236}">
-                <a16:creationId xmlns:a16="http://schemas.microsoft.com/office/drawing/2014/main" id="{F5F3B15A-58C1-48A3-AB6A-E8A3A8F0B1F0}"/>
+                <a16:creationId xmlns:a16="http://schemas.microsoft.com/office/drawing/2014/main" xmlns="" id="{F5F3B15A-58C1-48A3-AB6A-E8A3A8F0B1F0}"/>
               </a:ext>
             </a:extLst>
           </p:cNvPr>
@@ -2035,7 +2035,7 @@
           <p:cNvPr id="28" name="Google Shape;19;p14">
             <a:extLst>
               <a:ext uri="{FF2B5EF4-FFF2-40B4-BE49-F238E27FC236}">
-                <a16:creationId xmlns:a16="http://schemas.microsoft.com/office/drawing/2014/main" id="{A6353D6C-199F-4C21-9FC8-2D00FAAA26A6}"/>
+                <a16:creationId xmlns:a16="http://schemas.microsoft.com/office/drawing/2014/main" xmlns="" id="{A6353D6C-199F-4C21-9FC8-2D00FAAA26A6}"/>
               </a:ext>
             </a:extLst>
           </p:cNvPr>
@@ -2314,7 +2314,7 @@
           <p:cNvPr id="29" name="Google Shape;55;p1">
             <a:extLst>
               <a:ext uri="{FF2B5EF4-FFF2-40B4-BE49-F238E27FC236}">
-                <a16:creationId xmlns:a16="http://schemas.microsoft.com/office/drawing/2014/main" id="{4544F053-DAFF-4191-A4FE-EAC318BF6A0C}"/>
+                <a16:creationId xmlns:a16="http://schemas.microsoft.com/office/drawing/2014/main" xmlns="" id="{4544F053-DAFF-4191-A4FE-EAC318BF6A0C}"/>
               </a:ext>
             </a:extLst>
           </p:cNvPr>
@@ -2386,7 +2386,7 @@
           <p:cNvPr id="2" name="Title 1">
             <a:extLst>
               <a:ext uri="{FF2B5EF4-FFF2-40B4-BE49-F238E27FC236}">
-                <a16:creationId xmlns:a16="http://schemas.microsoft.com/office/drawing/2014/main" id="{7B6E2517-3805-41A0-9280-523D3C8CC82F}"/>
+                <a16:creationId xmlns:a16="http://schemas.microsoft.com/office/drawing/2014/main" xmlns="" id="{7B6E2517-3805-41A0-9280-523D3C8CC82F}"/>
               </a:ext>
             </a:extLst>
           </p:cNvPr>
@@ -2458,7 +2458,7 @@
           <p:cNvPr id="8" name="Google Shape;54;p1">
             <a:extLst>
               <a:ext uri="{FF2B5EF4-FFF2-40B4-BE49-F238E27FC236}">
-                <a16:creationId xmlns:a16="http://schemas.microsoft.com/office/drawing/2014/main" id="{631C2DF5-1362-47E0-9992-CA0F5EE5E7F4}"/>
+                <a16:creationId xmlns:a16="http://schemas.microsoft.com/office/drawing/2014/main" xmlns="" id="{631C2DF5-1362-47E0-9992-CA0F5EE5E7F4}"/>
               </a:ext>
             </a:extLst>
           </p:cNvPr>
@@ -2545,7 +2545,7 @@
           <p:cNvPr id="9" name="Google Shape;55;p1">
             <a:extLst>
               <a:ext uri="{FF2B5EF4-FFF2-40B4-BE49-F238E27FC236}">
-                <a16:creationId xmlns:a16="http://schemas.microsoft.com/office/drawing/2014/main" id="{E5E4EFC6-10AC-457A-90BE-EB16C5D5FDC1}"/>
+                <a16:creationId xmlns:a16="http://schemas.microsoft.com/office/drawing/2014/main" xmlns="" id="{E5E4EFC6-10AC-457A-90BE-EB16C5D5FDC1}"/>
               </a:ext>
             </a:extLst>
           </p:cNvPr>
@@ -2617,7 +2617,7 @@
           <p:cNvPr id="10" name="Oval 9">
             <a:extLst>
               <a:ext uri="{FF2B5EF4-FFF2-40B4-BE49-F238E27FC236}">
-                <a16:creationId xmlns:a16="http://schemas.microsoft.com/office/drawing/2014/main" id="{38DC77A7-8710-436F-B5E7-19B60E66B5F0}"/>
+                <a16:creationId xmlns:a16="http://schemas.microsoft.com/office/drawing/2014/main" xmlns="" id="{38DC77A7-8710-436F-B5E7-19B60E66B5F0}"/>
               </a:ext>
             </a:extLst>
           </p:cNvPr>
@@ -2660,7 +2660,7 @@
           <a:lstStyle/>
           <a:p>
             <a:pPr algn="ctr"/>
-            <a:endParaRPr lang="en-KW" sz="2400"/>
+            <a:endParaRPr lang="x-none" sz="2400"/>
           </a:p>
         </p:txBody>
       </p:sp>
@@ -2669,7 +2669,7 @@
           <p:cNvPr id="11" name="Picture 10" descr="A red and white background with a design&#10;&#10;Description automatically generated">
             <a:extLst>
               <a:ext uri="{FF2B5EF4-FFF2-40B4-BE49-F238E27FC236}">
-                <a16:creationId xmlns:a16="http://schemas.microsoft.com/office/drawing/2014/main" id="{418E62F8-02A7-4379-A005-0EF5EC635BBF}"/>
+                <a16:creationId xmlns:a16="http://schemas.microsoft.com/office/drawing/2014/main" xmlns="" id="{418E62F8-02A7-4379-A005-0EF5EC635BBF}"/>
               </a:ext>
             </a:extLst>
           </p:cNvPr>
@@ -2699,7 +2699,7 @@
           <p:cNvPr id="12" name="Picture 11">
             <a:extLst>
               <a:ext uri="{FF2B5EF4-FFF2-40B4-BE49-F238E27FC236}">
-                <a16:creationId xmlns:a16="http://schemas.microsoft.com/office/drawing/2014/main" id="{28A0ADE9-7A46-486B-82F3-A690D904DFF4}"/>
+                <a16:creationId xmlns:a16="http://schemas.microsoft.com/office/drawing/2014/main" xmlns="" id="{28A0ADE9-7A46-486B-82F3-A690D904DFF4}"/>
               </a:ext>
             </a:extLst>
           </p:cNvPr>
@@ -2926,7 +2926,7 @@
           <a:p>
             <a:fld id="{1D8BD707-D9CF-40AE-B4C6-C98DA3205C09}" type="datetimeFigureOut">
               <a:rPr lang="en-US"/>
-              <a:t>11/19/2024</a:t>
+              <a:t>1/14/2025</a:t>
             </a:fld>
             <a:endParaRPr lang="en-US"/>
           </a:p>
@@ -3206,7 +3206,7 @@
                   <a:noFill/>
                 </a:ln>
                 <a:solidFill>
-                  <a:srgbClr val="00B050"/>
+                  <a:srgbClr val="0033CC"/>
                 </a:solidFill>
                 <a:effectLst/>
                 <a:uLnTx/>
@@ -3242,7 +3242,7 @@
                   <a:noFill/>
                 </a:ln>
                 <a:solidFill>
-                  <a:srgbClr val="00B050"/>
+                  <a:srgbClr val="0033CC"/>
                 </a:solidFill>
                 <a:effectLst/>
                 <a:uLnTx/>
@@ -3259,7 +3259,7 @@
                   <a:noFill/>
                 </a:ln>
                 <a:solidFill>
-                  <a:srgbClr val="00B050"/>
+                  <a:srgbClr val="0033CC"/>
                 </a:solidFill>
                 <a:effectLst/>
                 <a:uLnTx/>
@@ -3276,7 +3276,7 @@
                   <a:noFill/>
                 </a:ln>
                 <a:solidFill>
-                  <a:srgbClr val="00B050"/>
+                  <a:srgbClr val="0033CC"/>
                 </a:solidFill>
                 <a:effectLst/>
                 <a:uLnTx/>
@@ -3285,15 +3285,15 @@
                 <a:ea typeface="+mn-ea"/>
                 <a:cs typeface="Arial" pitchFamily="34" charset="0"/>
               </a:rPr>
-              <a:t> 20</a:t>
-            </a:r>
-            <a:r>
-              <a:rPr kumimoji="0" lang="en-US" sz="3600" b="1" i="0" u="none" strike="noStrike" kern="1200" cap="none" spc="0" normalizeH="0" baseline="0" noProof="0" dirty="0">
+              <a:t> </a:t>
+            </a:r>
+            <a:r>
+              <a:rPr kumimoji="0" lang="x-none" sz="3600" b="1" i="0" u="none" strike="noStrike" kern="1200" cap="none" spc="0" normalizeH="0" baseline="0" noProof="0">
                 <a:ln>
                   <a:noFill/>
                 </a:ln>
                 <a:solidFill>
-                  <a:srgbClr val="00B050"/>
+                  <a:srgbClr val="0033CC"/>
                 </a:solidFill>
                 <a:effectLst/>
                 <a:uLnTx/>
@@ -3302,8 +3302,39 @@
                 <a:ea typeface="+mn-ea"/>
                 <a:cs typeface="Arial" pitchFamily="34" charset="0"/>
               </a:rPr>
-              <a:t>2</a:t>
-            </a:r>
+              <a:t>20</a:t>
+            </a:r>
+            <a:r>
+              <a:rPr kumimoji="0" lang="en-US" sz="3600" b="1" i="0" u="none" strike="noStrike" kern="1200" cap="none" spc="0" normalizeH="0" baseline="0" noProof="0" dirty="0" smtClean="0">
+                <a:ln>
+                  <a:noFill/>
+                </a:ln>
+                <a:solidFill>
+                  <a:srgbClr val="0033CC"/>
+                </a:solidFill>
+                <a:effectLst/>
+                <a:uLnTx/>
+                <a:uFillTx/>
+                <a:latin typeface="Arial" pitchFamily="34" charset="0"/>
+                <a:ea typeface="+mn-ea"/>
+                <a:cs typeface="Arial" pitchFamily="34" charset="0"/>
+              </a:rPr>
+              <a:t>2 – Spring 2025</a:t>
+            </a:r>
+            <a:endParaRPr kumimoji="0" lang="en-US" sz="3600" b="1" i="0" u="none" strike="noStrike" kern="1200" cap="none" spc="0" normalizeH="0" baseline="0" noProof="0" dirty="0">
+              <a:ln>
+                <a:noFill/>
+              </a:ln>
+              <a:solidFill>
+                <a:srgbClr val="0033CC"/>
+              </a:solidFill>
+              <a:effectLst/>
+              <a:uLnTx/>
+              <a:uFillTx/>
+              <a:latin typeface="Arial" pitchFamily="34" charset="0"/>
+              <a:ea typeface="+mn-ea"/>
+              <a:cs typeface="Arial" pitchFamily="34" charset="0"/>
+            </a:endParaRPr>
           </a:p>
         </p:txBody>
       </p:sp>
@@ -3312,7 +3343,7 @@
           <p:cNvPr id="2" name="TextBox 1">
             <a:extLst>
               <a:ext uri="{FF2B5EF4-FFF2-40B4-BE49-F238E27FC236}">
-                <a16:creationId xmlns:a16="http://schemas.microsoft.com/office/drawing/2014/main" id="{07DEEC26-75A9-F4A2-6948-691F17B753B2}"/>
+                <a16:creationId xmlns:a16="http://schemas.microsoft.com/office/drawing/2014/main" xmlns="" id="{07DEEC26-75A9-F4A2-6948-691F17B753B2}"/>
               </a:ext>
             </a:extLst>
           </p:cNvPr>
@@ -3358,7 +3389,7 @@
                   <a:noFill/>
                 </a:ln>
                 <a:solidFill>
-                  <a:srgbClr val="0000FF"/>
+                  <a:srgbClr val="00B050"/>
                 </a:solidFill>
                 <a:effectLst/>
                 <a:uLnTx/>
@@ -3375,7 +3406,7 @@
                   <a:noFill/>
                 </a:ln>
                 <a:solidFill>
-                  <a:srgbClr val="0000FF"/>
+                  <a:srgbClr val="00B050"/>
                 </a:solidFill>
                 <a:effectLst/>
                 <a:uLnTx/>
@@ -3443,7 +3474,7 @@
             <a:r>
               <a:rPr lang="en-US" sz="4000" b="1" dirty="0">
                 <a:solidFill>
-                  <a:srgbClr val="0033CC"/>
+                  <a:srgbClr val="00B050"/>
                 </a:solidFill>
                 <a:latin typeface="Cambria" panose="02040503050406030204" pitchFamily="18" charset="0"/>
                 <a:ea typeface="Cambria" panose="02040503050406030204" pitchFamily="18" charset="0"/>
@@ -3458,7 +3489,7 @@
           <p:cNvPr id="6" name="TextBox 5">
             <a:extLst>
               <a:ext uri="{FF2B5EF4-FFF2-40B4-BE49-F238E27FC236}">
-                <a16:creationId xmlns:a16="http://schemas.microsoft.com/office/drawing/2014/main" id="{0654FFA1-83B2-4453-ACA6-EE445F0C37D9}"/>
+                <a16:creationId xmlns:a16="http://schemas.microsoft.com/office/drawing/2014/main" xmlns="" id="{0654FFA1-83B2-4453-ACA6-EE445F0C37D9}"/>
               </a:ext>
             </a:extLst>
           </p:cNvPr>
@@ -3535,7 +3566,7 @@
           <p:cNvPr id="18" name="TextBox 17">
             <a:extLst>
               <a:ext uri="{FF2B5EF4-FFF2-40B4-BE49-F238E27FC236}">
-                <a16:creationId xmlns:a16="http://schemas.microsoft.com/office/drawing/2014/main" id="{FE04B372-2A53-E563-4ABC-14DF8D382AC1}"/>
+                <a16:creationId xmlns:a16="http://schemas.microsoft.com/office/drawing/2014/main" xmlns="" id="{FE04B372-2A53-E563-4ABC-14DF8D382AC1}"/>
               </a:ext>
             </a:extLst>
           </p:cNvPr>
@@ -3582,7 +3613,7 @@
           <p:cNvPr id="5" name="Picture 4">
             <a:extLst>
               <a:ext uri="{FF2B5EF4-FFF2-40B4-BE49-F238E27FC236}">
-                <a16:creationId xmlns:a16="http://schemas.microsoft.com/office/drawing/2014/main" id="{0EB2BA32-5FFC-ED14-F7BB-E7B90647B5D6}"/>
+                <a16:creationId xmlns:a16="http://schemas.microsoft.com/office/drawing/2014/main" xmlns="" id="{0EB2BA32-5FFC-ED14-F7BB-E7B90647B5D6}"/>
               </a:ext>
             </a:extLst>
           </p:cNvPr>
@@ -3656,7 +3687,7 @@
             <a:r>
               <a:rPr lang="en-US" sz="4000" b="1" dirty="0">
                 <a:solidFill>
-                  <a:srgbClr val="0033CC"/>
+                  <a:srgbClr val="00B050"/>
                 </a:solidFill>
                 <a:latin typeface="Cambria" panose="02040503050406030204" pitchFamily="18" charset="0"/>
                 <a:ea typeface="Cambria" panose="02040503050406030204" pitchFamily="18" charset="0"/>
@@ -3673,7 +3704,7 @@
               <p:cNvPr id="6" name="TextBox 5">
                 <a:extLst>
                   <a:ext uri="{FF2B5EF4-FFF2-40B4-BE49-F238E27FC236}">
-                    <a16:creationId xmlns:a16="http://schemas.microsoft.com/office/drawing/2014/main" id="{0654FFA1-83B2-4453-ACA6-EE445F0C37D9}"/>
+                    <a16:creationId xmlns:a16="http://schemas.microsoft.com/office/drawing/2014/main" xmlns="" id="{0654FFA1-83B2-4453-ACA6-EE445F0C37D9}"/>
                   </a:ext>
                 </a:extLst>
               </p:cNvPr>
@@ -3840,7 +3871,7 @@
                       <m:fPr>
                         <m:ctrlPr>
                           <a:rPr lang="en-GB" sz="2000" i="1" dirty="0">
-                            <a:latin typeface="Cambria Math" panose="02040503050406030204" pitchFamily="18" charset="0"/>
+                            <a:latin typeface="Cambria Math"/>
                             <a:ea typeface="Cambria" panose="02040503050406030204" pitchFamily="18" charset="0"/>
                             <a:cs typeface="Times New Roman" panose="02020603050405020304" pitchFamily="18" charset="0"/>
                           </a:rPr>
@@ -3869,7 +3900,7 @@
                           <m:sSubPr>
                             <m:ctrlPr>
                               <a:rPr lang="en-GB" sz="2000" i="1" dirty="0">
-                                <a:latin typeface="Cambria Math" panose="02040503050406030204" pitchFamily="18" charset="0"/>
+                                <a:latin typeface="Cambria Math"/>
                                 <a:ea typeface="Cambria" panose="02040503050406030204" pitchFamily="18" charset="0"/>
                                 <a:cs typeface="Times New Roman" panose="02020603050405020304" pitchFamily="18" charset="0"/>
                               </a:rPr>
@@ -3973,7 +4004,7 @@
           <p:cNvPr id="5" name="Picture 4">
             <a:extLst>
               <a:ext uri="{FF2B5EF4-FFF2-40B4-BE49-F238E27FC236}">
-                <a16:creationId xmlns:a16="http://schemas.microsoft.com/office/drawing/2014/main" id="{0EB2BA32-5FFC-ED14-F7BB-E7B90647B5D6}"/>
+                <a16:creationId xmlns:a16="http://schemas.microsoft.com/office/drawing/2014/main" xmlns="" id="{0EB2BA32-5FFC-ED14-F7BB-E7B90647B5D6}"/>
               </a:ext>
             </a:extLst>
           </p:cNvPr>
@@ -4019,7 +4050,7 @@
         <p:cNvPr id="1" name="">
           <a:extLst>
             <a:ext uri="{FF2B5EF4-FFF2-40B4-BE49-F238E27FC236}">
-              <a16:creationId xmlns:a16="http://schemas.microsoft.com/office/drawing/2014/main" id="{56A797CB-0268-3133-8FCE-DA4565E5ED61}"/>
+              <a16:creationId xmlns:a16="http://schemas.microsoft.com/office/drawing/2014/main" xmlns="" id="{56A797CB-0268-3133-8FCE-DA4565E5ED61}"/>
             </a:ext>
           </a:extLst>
         </p:cNvPr>
@@ -4039,7 +4070,7 @@
           <p:cNvPr id="8" name="TextBox 7">
             <a:extLst>
               <a:ext uri="{FF2B5EF4-FFF2-40B4-BE49-F238E27FC236}">
-                <a16:creationId xmlns:a16="http://schemas.microsoft.com/office/drawing/2014/main" id="{4072D0FD-1E04-B940-627A-EA9DA05DCCCD}"/>
+                <a16:creationId xmlns:a16="http://schemas.microsoft.com/office/drawing/2014/main" xmlns="" id="{4072D0FD-1E04-B940-627A-EA9DA05DCCCD}"/>
               </a:ext>
             </a:extLst>
           </p:cNvPr>
@@ -4075,7 +4106,11 @@
           </a:lstStyle>
           <a:p>
             <a:r>
-              <a:rPr lang="en-GB" dirty="0"/>
+              <a:rPr lang="en-GB" dirty="0">
+                <a:solidFill>
+                  <a:srgbClr val="00B050"/>
+                </a:solidFill>
+              </a:rPr>
               <a:t>Answer the following questions using ChatGPT</a:t>
             </a:r>
           </a:p>
@@ -4086,7 +4121,7 @@
           <p:cNvPr id="5" name="Rectangle 1">
             <a:extLst>
               <a:ext uri="{FF2B5EF4-FFF2-40B4-BE49-F238E27FC236}">
-                <a16:creationId xmlns:a16="http://schemas.microsoft.com/office/drawing/2014/main" id="{962679F9-FDA9-7E27-5D03-BD19DA1072F8}"/>
+                <a16:creationId xmlns:a16="http://schemas.microsoft.com/office/drawing/2014/main" xmlns="" id="{962679F9-FDA9-7E27-5D03-BD19DA1072F8}"/>
               </a:ext>
             </a:extLst>
           </p:cNvPr>
@@ -4604,7 +4639,7 @@
           <p:cNvPr id="8" name="TextBox 7">
             <a:extLst>
               <a:ext uri="{FF2B5EF4-FFF2-40B4-BE49-F238E27FC236}">
-                <a16:creationId xmlns:a16="http://schemas.microsoft.com/office/drawing/2014/main" id="{EE682696-4D97-5DA5-8893-F9A16A798ADB}"/>
+                <a16:creationId xmlns:a16="http://schemas.microsoft.com/office/drawing/2014/main" xmlns="" id="{EE682696-4D97-5DA5-8893-F9A16A798ADB}"/>
               </a:ext>
             </a:extLst>
           </p:cNvPr>
@@ -4640,7 +4675,11 @@
           </a:lstStyle>
           <a:p>
             <a:r>
-              <a:rPr lang="en-GB" dirty="0"/>
+              <a:rPr lang="en-GB" dirty="0">
+                <a:solidFill>
+                  <a:srgbClr val="00B050"/>
+                </a:solidFill>
+              </a:rPr>
               <a:t>Summary</a:t>
             </a:r>
           </a:p>
@@ -4651,7 +4690,7 @@
           <p:cNvPr id="10" name="Content Placeholder 2">
             <a:extLst>
               <a:ext uri="{FF2B5EF4-FFF2-40B4-BE49-F238E27FC236}">
-                <a16:creationId xmlns:a16="http://schemas.microsoft.com/office/drawing/2014/main" id="{CDC31E4C-0573-EDA7-0566-DEC814C49284}"/>
+                <a16:creationId xmlns:a16="http://schemas.microsoft.com/office/drawing/2014/main" xmlns="" id="{CDC31E4C-0573-EDA7-0566-DEC814C49284}"/>
               </a:ext>
             </a:extLst>
           </p:cNvPr>
@@ -5039,7 +5078,7 @@
         <p:spPr>
           <a:xfrm>
             <a:off x="387464" y="558856"/>
-            <a:ext cx="4834261" cy="901465"/>
+            <a:ext cx="4834261" cy="1015663"/>
           </a:xfrm>
           <a:prstGeom prst="rect">
             <a:avLst/>
@@ -5075,7 +5114,7 @@
                   <a:noFill/>
                 </a:ln>
                 <a:solidFill>
-                  <a:srgbClr val="0000FF"/>
+                  <a:srgbClr val="00B050"/>
                 </a:solidFill>
                 <a:effectLst/>
                 <a:uLnTx/>
@@ -5447,7 +5486,7 @@
                   <a:noFill/>
                 </a:ln>
                 <a:solidFill>
-                  <a:srgbClr val="0000FF"/>
+                  <a:srgbClr val="00B050"/>
                 </a:solidFill>
                 <a:effectLst/>
                 <a:uLnTx/>
@@ -5728,7 +5767,7 @@
           <p:cNvPr id="5" name="مربع نص 1">
             <a:extLst>
               <a:ext uri="{FF2B5EF4-FFF2-40B4-BE49-F238E27FC236}">
-                <a16:creationId xmlns:a16="http://schemas.microsoft.com/office/drawing/2014/main" id="{7711DB52-DA0E-C95D-DFAF-CCC7BD2BE49D}"/>
+                <a16:creationId xmlns:a16="http://schemas.microsoft.com/office/drawing/2014/main" xmlns="" id="{7711DB52-DA0E-C95D-DFAF-CCC7BD2BE49D}"/>
               </a:ext>
             </a:extLst>
           </p:cNvPr>
@@ -5738,7 +5777,7 @@
         <p:spPr>
           <a:xfrm>
             <a:off x="950647" y="2536261"/>
-            <a:ext cx="4834261" cy="901465"/>
+            <a:ext cx="4834261" cy="1015663"/>
           </a:xfrm>
           <a:prstGeom prst="rect">
             <a:avLst/>
@@ -5774,7 +5813,7 @@
                   <a:noFill/>
                 </a:ln>
                 <a:solidFill>
-                  <a:srgbClr val="0000FF"/>
+                  <a:srgbClr val="00B050"/>
                 </a:solidFill>
                 <a:effectLst/>
                 <a:uLnTx/>
@@ -5793,7 +5832,7 @@
           <p:cNvPr id="6" name="TextBox 5">
             <a:extLst>
               <a:ext uri="{FF2B5EF4-FFF2-40B4-BE49-F238E27FC236}">
-                <a16:creationId xmlns:a16="http://schemas.microsoft.com/office/drawing/2014/main" id="{C6E955C2-410D-5EE0-CFAB-8FE55D451121}"/>
+                <a16:creationId xmlns:a16="http://schemas.microsoft.com/office/drawing/2014/main" xmlns="" id="{C6E955C2-410D-5EE0-CFAB-8FE55D451121}"/>
               </a:ext>
             </a:extLst>
           </p:cNvPr>
@@ -5979,7 +6018,7 @@
             <a:r>
               <a:rPr lang="en-US" sz="4000" b="1" dirty="0">
                 <a:solidFill>
-                  <a:srgbClr val="0033CC"/>
+                  <a:srgbClr val="00B050"/>
                 </a:solidFill>
                 <a:latin typeface="Cambria" panose="02040503050406030204" pitchFamily="18" charset="0"/>
                 <a:ea typeface="Cambria" panose="02040503050406030204" pitchFamily="18" charset="0"/>
@@ -5994,7 +6033,7 @@
           <p:cNvPr id="6" name="TextBox 5">
             <a:extLst>
               <a:ext uri="{FF2B5EF4-FFF2-40B4-BE49-F238E27FC236}">
-                <a16:creationId xmlns:a16="http://schemas.microsoft.com/office/drawing/2014/main" id="{0654FFA1-83B2-4453-ACA6-EE445F0C37D9}"/>
+                <a16:creationId xmlns:a16="http://schemas.microsoft.com/office/drawing/2014/main" xmlns="" id="{0654FFA1-83B2-4453-ACA6-EE445F0C37D9}"/>
               </a:ext>
             </a:extLst>
           </p:cNvPr>
@@ -6139,31 +6178,6 @@
       </p:grpSpPr>
       <p:sp>
         <p:nvSpPr>
-          <p:cNvPr id="3" name="Text Placeholder 2">
-            <a:extLst>
-              <a:ext uri="{FF2B5EF4-FFF2-40B4-BE49-F238E27FC236}">
-                <a16:creationId xmlns:a16="http://schemas.microsoft.com/office/drawing/2014/main" id="{01DFE69C-D5D9-46E7-5A6A-0EDE76CD0C9A}"/>
-              </a:ext>
-            </a:extLst>
-          </p:cNvPr>
-          <p:cNvSpPr>
-            <a:spLocks noGrp="1"/>
-          </p:cNvSpPr>
-          <p:nvPr>
-            <p:ph type="body" idx="1"/>
-          </p:nvPr>
-        </p:nvSpPr>
-        <p:spPr/>
-        <p:txBody>
-          <a:bodyPr/>
-          <a:lstStyle/>
-          <a:p>
-            <a:endParaRPr lang="en-GB"/>
-          </a:p>
-        </p:txBody>
-      </p:sp>
-      <p:sp>
-        <p:nvSpPr>
           <p:cNvPr id="2" name="Title 1"/>
           <p:cNvSpPr>
             <a:spLocks noGrp="1"/>
@@ -6181,7 +6195,7 @@
             <a:r>
               <a:rPr lang="en-US" sz="4000" b="1" dirty="0">
                 <a:solidFill>
-                  <a:srgbClr val="0033CC"/>
+                  <a:srgbClr val="00B050"/>
                 </a:solidFill>
                 <a:latin typeface="Cambria" panose="02040503050406030204" pitchFamily="18" charset="0"/>
                 <a:ea typeface="Cambria" panose="02040503050406030204" pitchFamily="18" charset="0"/>
@@ -6196,7 +6210,7 @@
           <p:cNvPr id="6" name="TextBox 5">
             <a:extLst>
               <a:ext uri="{FF2B5EF4-FFF2-40B4-BE49-F238E27FC236}">
-                <a16:creationId xmlns:a16="http://schemas.microsoft.com/office/drawing/2014/main" id="{0654FFA1-83B2-4453-ACA6-EE445F0C37D9}"/>
+                <a16:creationId xmlns:a16="http://schemas.microsoft.com/office/drawing/2014/main" xmlns="" id="{0654FFA1-83B2-4453-ACA6-EE445F0C37D9}"/>
               </a:ext>
             </a:extLst>
           </p:cNvPr>
@@ -6205,7 +6219,7 @@
         </p:nvSpPr>
         <p:spPr>
           <a:xfrm>
-            <a:off x="1024129" y="1392130"/>
+            <a:off x="506336" y="1722637"/>
             <a:ext cx="9555480" cy="3416320"/>
           </a:xfrm>
           <a:prstGeom prst="rect">
@@ -6363,31 +6377,6 @@
       </p:grpSpPr>
       <p:sp>
         <p:nvSpPr>
-          <p:cNvPr id="17" name="Text Placeholder 16">
-            <a:extLst>
-              <a:ext uri="{FF2B5EF4-FFF2-40B4-BE49-F238E27FC236}">
-                <a16:creationId xmlns:a16="http://schemas.microsoft.com/office/drawing/2014/main" id="{C1D944E3-C646-AFD4-11EA-E89508CE4637}"/>
-              </a:ext>
-            </a:extLst>
-          </p:cNvPr>
-          <p:cNvSpPr>
-            <a:spLocks noGrp="1"/>
-          </p:cNvSpPr>
-          <p:nvPr>
-            <p:ph type="body" idx="1"/>
-          </p:nvPr>
-        </p:nvSpPr>
-        <p:spPr/>
-        <p:txBody>
-          <a:bodyPr/>
-          <a:lstStyle/>
-          <a:p>
-            <a:endParaRPr lang="en-GB"/>
-          </a:p>
-        </p:txBody>
-      </p:sp>
-      <p:sp>
-        <p:nvSpPr>
           <p:cNvPr id="2" name="Title 1"/>
           <p:cNvSpPr>
             <a:spLocks noGrp="1"/>
@@ -6405,7 +6394,7 @@
             <a:r>
               <a:rPr lang="en-US" sz="4000" b="1" dirty="0">
                 <a:solidFill>
-                  <a:srgbClr val="0033CC"/>
+                  <a:srgbClr val="00B050"/>
                 </a:solidFill>
                 <a:latin typeface="Cambria" panose="02040503050406030204" pitchFamily="18" charset="0"/>
                 <a:ea typeface="Cambria" panose="02040503050406030204" pitchFamily="18" charset="0"/>
@@ -6420,7 +6409,7 @@
           <p:cNvPr id="6" name="TextBox 5">
             <a:extLst>
               <a:ext uri="{FF2B5EF4-FFF2-40B4-BE49-F238E27FC236}">
-                <a16:creationId xmlns:a16="http://schemas.microsoft.com/office/drawing/2014/main" id="{0654FFA1-83B2-4453-ACA6-EE445F0C37D9}"/>
+                <a16:creationId xmlns:a16="http://schemas.microsoft.com/office/drawing/2014/main" xmlns="" id="{0654FFA1-83B2-4453-ACA6-EE445F0C37D9}"/>
               </a:ext>
             </a:extLst>
           </p:cNvPr>
@@ -6474,7 +6463,7 @@
           <p:cNvPr id="3" name="Group 2">
             <a:extLst>
               <a:ext uri="{FF2B5EF4-FFF2-40B4-BE49-F238E27FC236}">
-                <a16:creationId xmlns:a16="http://schemas.microsoft.com/office/drawing/2014/main" id="{13D5A8D9-EB00-0B5C-F0CA-BDA53F5ECA44}"/>
+                <a16:creationId xmlns:a16="http://schemas.microsoft.com/office/drawing/2014/main" xmlns="" id="{13D5A8D9-EB00-0B5C-F0CA-BDA53F5ECA44}"/>
               </a:ext>
             </a:extLst>
           </p:cNvPr>
@@ -6494,7 +6483,7 @@
             <p:cNvPr id="4" name="Group 3">
               <a:extLst>
                 <a:ext uri="{FF2B5EF4-FFF2-40B4-BE49-F238E27FC236}">
-                  <a16:creationId xmlns:a16="http://schemas.microsoft.com/office/drawing/2014/main" id="{095F0488-D9AC-AE2D-0E42-2B0B8A3DE0F5}"/>
+                  <a16:creationId xmlns:a16="http://schemas.microsoft.com/office/drawing/2014/main" xmlns="" id="{095F0488-D9AC-AE2D-0E42-2B0B8A3DE0F5}"/>
                 </a:ext>
               </a:extLst>
             </p:cNvPr>
@@ -6514,7 +6503,7 @@
               <p:cNvPr id="12" name="Picture 2">
                 <a:extLst>
                   <a:ext uri="{FF2B5EF4-FFF2-40B4-BE49-F238E27FC236}">
-                    <a16:creationId xmlns:a16="http://schemas.microsoft.com/office/drawing/2014/main" id="{F21852BA-FE0E-153B-4ED6-CFB93BBB4DF2}"/>
+                    <a16:creationId xmlns:a16="http://schemas.microsoft.com/office/drawing/2014/main" xmlns="" id="{F21852BA-FE0E-153B-4ED6-CFB93BBB4DF2}"/>
                   </a:ext>
                 </a:extLst>
               </p:cNvPr>
@@ -6524,7 +6513,7 @@
               <p:nvPr/>
             </p:nvPicPr>
             <p:blipFill>
-              <a:blip r:embed="rId2" cstate="print"/>
+              <a:blip r:embed="rId3" cstate="print"/>
               <a:srcRect/>
               <a:stretch>
                 <a:fillRect/>
@@ -6552,7 +6541,7 @@
               <p:cNvPr id="13" name="TextBox 12">
                 <a:extLst>
                   <a:ext uri="{FF2B5EF4-FFF2-40B4-BE49-F238E27FC236}">
-                    <a16:creationId xmlns:a16="http://schemas.microsoft.com/office/drawing/2014/main" id="{D76CE3AB-5C82-1481-CE25-973E1DCB2A6A}"/>
+                    <a16:creationId xmlns:a16="http://schemas.microsoft.com/office/drawing/2014/main" xmlns="" id="{D76CE3AB-5C82-1481-CE25-973E1DCB2A6A}"/>
                   </a:ext>
                 </a:extLst>
               </p:cNvPr>
@@ -6596,7 +6585,7 @@
               <p:cNvPr id="14" name="TextBox 13">
                 <a:extLst>
                   <a:ext uri="{FF2B5EF4-FFF2-40B4-BE49-F238E27FC236}">
-                    <a16:creationId xmlns:a16="http://schemas.microsoft.com/office/drawing/2014/main" id="{3E3E77A1-9953-5078-9C02-6F44BDF4E591}"/>
+                    <a16:creationId xmlns:a16="http://schemas.microsoft.com/office/drawing/2014/main" xmlns="" id="{3E3E77A1-9953-5078-9C02-6F44BDF4E591}"/>
                   </a:ext>
                 </a:extLst>
               </p:cNvPr>
@@ -6640,7 +6629,7 @@
               <p:cNvPr id="15" name="TextBox 14">
                 <a:extLst>
                   <a:ext uri="{FF2B5EF4-FFF2-40B4-BE49-F238E27FC236}">
-                    <a16:creationId xmlns:a16="http://schemas.microsoft.com/office/drawing/2014/main" id="{76D00682-CF16-EE25-DFE8-F0B3133353C6}"/>
+                    <a16:creationId xmlns:a16="http://schemas.microsoft.com/office/drawing/2014/main" xmlns="" id="{76D00682-CF16-EE25-DFE8-F0B3133353C6}"/>
                   </a:ext>
                 </a:extLst>
               </p:cNvPr>
@@ -6684,7 +6673,7 @@
               <p:cNvPr id="16" name="TextBox 15">
                 <a:extLst>
                   <a:ext uri="{FF2B5EF4-FFF2-40B4-BE49-F238E27FC236}">
-                    <a16:creationId xmlns:a16="http://schemas.microsoft.com/office/drawing/2014/main" id="{162D355C-C56B-1D40-585B-02824B4AF878}"/>
+                    <a16:creationId xmlns:a16="http://schemas.microsoft.com/office/drawing/2014/main" xmlns="" id="{162D355C-C56B-1D40-585B-02824B4AF878}"/>
                   </a:ext>
                 </a:extLst>
               </p:cNvPr>
@@ -6729,7 +6718,7 @@
             <p:cNvPr id="5" name="Object 2">
               <a:extLst>
                 <a:ext uri="{FF2B5EF4-FFF2-40B4-BE49-F238E27FC236}">
-                  <a16:creationId xmlns:a16="http://schemas.microsoft.com/office/drawing/2014/main" id="{E5E83883-F671-8F20-B219-DA97875E452C}"/>
+                  <a16:creationId xmlns:a16="http://schemas.microsoft.com/office/drawing/2014/main" xmlns="" id="{E5E83883-F671-8F20-B219-DA97875E452C}"/>
                 </a:ext>
               </a:extLst>
             </p:cNvPr>
@@ -6746,12 +6735,12 @@
             <a:graphicData uri="http://schemas.openxmlformats.org/presentationml/2006/ole">
               <mc:AlternateContent xmlns:mc="http://schemas.openxmlformats.org/markup-compatibility/2006">
                 <mc:Choice xmlns:v="urn:schemas-microsoft-com:vml" Requires="v">
-                  <p:oleObj name="Equation" r:id="rId3" imgW="508000" imgH="279400" progId="Equation.DSMT4">
+                  <p:oleObj spid="_x0000_s1044" name="Equation" r:id="rId4" imgW="508000" imgH="279400" progId="Equation.DSMT4">
                     <p:embed/>
                   </p:oleObj>
                 </mc:Choice>
                 <mc:Fallback>
-                  <p:oleObj name="Equation" r:id="rId3" imgW="508000" imgH="279400" progId="Equation.DSMT4">
+                  <p:oleObj name="Equation" r:id="rId4" imgW="508000" imgH="279400" progId="Equation.DSMT4">
                     <p:embed/>
                     <p:pic>
                       <p:nvPicPr>
@@ -6762,7 +6751,7 @@
                         <p:nvPr/>
                       </p:nvPicPr>
                       <p:blipFill>
-                        <a:blip r:embed="rId4">
+                        <a:blip r:embed="rId5">
                           <a:extLst>
                             <a:ext uri="{28A0092B-C50C-407E-A947-70E740481C1C}">
                               <a14:useLocalDpi xmlns:a14="http://schemas.microsoft.com/office/drawing/2010/main" val="0"/>
@@ -6828,7 +6817,7 @@
             <p:cNvPr id="7" name="Object 8">
               <a:extLst>
                 <a:ext uri="{FF2B5EF4-FFF2-40B4-BE49-F238E27FC236}">
-                  <a16:creationId xmlns:a16="http://schemas.microsoft.com/office/drawing/2014/main" id="{D01A3126-9321-1C43-728B-35CCAEFC7942}"/>
+                  <a16:creationId xmlns:a16="http://schemas.microsoft.com/office/drawing/2014/main" xmlns="" id="{D01A3126-9321-1C43-728B-35CCAEFC7942}"/>
                 </a:ext>
               </a:extLst>
             </p:cNvPr>
@@ -6845,12 +6834,12 @@
             <a:graphicData uri="http://schemas.openxmlformats.org/presentationml/2006/ole">
               <mc:AlternateContent xmlns:mc="http://schemas.openxmlformats.org/markup-compatibility/2006">
                 <mc:Choice xmlns:v="urn:schemas-microsoft-com:vml" Requires="v">
-                  <p:oleObj name="Equation" r:id="rId3" imgW="508000" imgH="279400" progId="Equation.DSMT4">
+                  <p:oleObj spid="_x0000_s1045" name="Equation" r:id="rId6" imgW="508000" imgH="279400" progId="Equation.DSMT4">
                     <p:embed/>
                   </p:oleObj>
                 </mc:Choice>
                 <mc:Fallback>
-                  <p:oleObj name="Equation" r:id="rId3" imgW="508000" imgH="279400" progId="Equation.DSMT4">
+                  <p:oleObj name="Equation" r:id="rId6" imgW="508000" imgH="279400" progId="Equation.DSMT4">
                     <p:embed/>
                     <p:pic>
                       <p:nvPicPr>
@@ -6861,7 +6850,7 @@
                         <p:nvPr/>
                       </p:nvPicPr>
                       <p:blipFill>
-                        <a:blip r:embed="rId4">
+                        <a:blip r:embed="rId5">
                           <a:extLst>
                             <a:ext uri="{28A0092B-C50C-407E-A947-70E740481C1C}">
                               <a14:useLocalDpi xmlns:a14="http://schemas.microsoft.com/office/drawing/2010/main" val="0"/>
@@ -6927,7 +6916,7 @@
             <p:cNvPr id="8" name="Object 8">
               <a:extLst>
                 <a:ext uri="{FF2B5EF4-FFF2-40B4-BE49-F238E27FC236}">
-                  <a16:creationId xmlns:a16="http://schemas.microsoft.com/office/drawing/2014/main" id="{E12EA284-E727-4837-E16D-B05B8B81756F}"/>
+                  <a16:creationId xmlns:a16="http://schemas.microsoft.com/office/drawing/2014/main" xmlns="" id="{E12EA284-E727-4837-E16D-B05B8B81756F}"/>
                 </a:ext>
               </a:extLst>
             </p:cNvPr>
@@ -6944,12 +6933,12 @@
             <a:graphicData uri="http://schemas.openxmlformats.org/presentationml/2006/ole">
               <mc:AlternateContent xmlns:mc="http://schemas.openxmlformats.org/markup-compatibility/2006">
                 <mc:Choice xmlns:v="urn:schemas-microsoft-com:vml" Requires="v">
-                  <p:oleObj name="Equation" r:id="rId5" imgW="533169" imgH="228501" progId="Equation.DSMT4">
+                  <p:oleObj spid="_x0000_s1046" name="Equation" r:id="rId7" imgW="533169" imgH="228501" progId="Equation.DSMT4">
                     <p:embed/>
                   </p:oleObj>
                 </mc:Choice>
                 <mc:Fallback>
-                  <p:oleObj name="Equation" r:id="rId5" imgW="533169" imgH="228501" progId="Equation.DSMT4">
+                  <p:oleObj name="Equation" r:id="rId7" imgW="533169" imgH="228501" progId="Equation.DSMT4">
                     <p:embed/>
                     <p:pic>
                       <p:nvPicPr>
@@ -6960,7 +6949,7 @@
                         <p:nvPr/>
                       </p:nvPicPr>
                       <p:blipFill>
-                        <a:blip r:embed="rId6">
+                        <a:blip r:embed="rId8">
                           <a:extLst>
                             <a:ext uri="{28A0092B-C50C-407E-A947-70E740481C1C}">
                               <a14:useLocalDpi xmlns:a14="http://schemas.microsoft.com/office/drawing/2010/main" val="0"/>
@@ -7026,7 +7015,7 @@
             <p:cNvPr id="9" name="Object 8">
               <a:extLst>
                 <a:ext uri="{FF2B5EF4-FFF2-40B4-BE49-F238E27FC236}">
-                  <a16:creationId xmlns:a16="http://schemas.microsoft.com/office/drawing/2014/main" id="{BF058AED-3C0C-0A38-0339-9ED854A7AD4F}"/>
+                  <a16:creationId xmlns:a16="http://schemas.microsoft.com/office/drawing/2014/main" xmlns="" id="{BF058AED-3C0C-0A38-0339-9ED854A7AD4F}"/>
                 </a:ext>
               </a:extLst>
             </p:cNvPr>
@@ -7043,12 +7032,12 @@
             <a:graphicData uri="http://schemas.openxmlformats.org/presentationml/2006/ole">
               <mc:AlternateContent xmlns:mc="http://schemas.openxmlformats.org/markup-compatibility/2006">
                 <mc:Choice xmlns:v="urn:schemas-microsoft-com:vml" Requires="v">
-                  <p:oleObj name="Equation" r:id="rId5" imgW="533169" imgH="228501" progId="Equation.DSMT4">
+                  <p:oleObj spid="_x0000_s1047" name="Equation" r:id="rId9" imgW="533169" imgH="228501" progId="Equation.DSMT4">
                     <p:embed/>
                   </p:oleObj>
                 </mc:Choice>
                 <mc:Fallback>
-                  <p:oleObj name="Equation" r:id="rId5" imgW="533169" imgH="228501" progId="Equation.DSMT4">
+                  <p:oleObj name="Equation" r:id="rId9" imgW="533169" imgH="228501" progId="Equation.DSMT4">
                     <p:embed/>
                     <p:pic>
                       <p:nvPicPr>
@@ -7059,7 +7048,7 @@
                         <p:nvPr/>
                       </p:nvPicPr>
                       <p:blipFill>
-                        <a:blip r:embed="rId6">
+                        <a:blip r:embed="rId8">
                           <a:extLst>
                             <a:ext uri="{28A0092B-C50C-407E-A947-70E740481C1C}">
                               <a14:useLocalDpi xmlns:a14="http://schemas.microsoft.com/office/drawing/2010/main" val="0"/>
@@ -7125,7 +7114,7 @@
             <p:cNvPr id="10" name="Object 8">
               <a:extLst>
                 <a:ext uri="{FF2B5EF4-FFF2-40B4-BE49-F238E27FC236}">
-                  <a16:creationId xmlns:a16="http://schemas.microsoft.com/office/drawing/2014/main" id="{FBFDA03B-2C6C-A9DF-FB82-0C8236463B3D}"/>
+                  <a16:creationId xmlns:a16="http://schemas.microsoft.com/office/drawing/2014/main" xmlns="" id="{FBFDA03B-2C6C-A9DF-FB82-0C8236463B3D}"/>
                 </a:ext>
               </a:extLst>
             </p:cNvPr>
@@ -7148,12 +7137,12 @@
             <a:graphicData uri="http://schemas.openxmlformats.org/presentationml/2006/ole">
               <mc:AlternateContent xmlns:mc="http://schemas.openxmlformats.org/markup-compatibility/2006">
                 <mc:Choice xmlns:v="urn:schemas-microsoft-com:vml" Requires="v">
-                  <p:oleObj name="Equation" r:id="rId5" imgW="533169" imgH="228501" progId="Equation.DSMT4">
+                  <p:oleObj spid="_x0000_s1048" name="Equation" r:id="rId10" imgW="533169" imgH="228501" progId="Equation.DSMT4">
                     <p:embed/>
                   </p:oleObj>
                 </mc:Choice>
                 <mc:Fallback>
-                  <p:oleObj name="Equation" r:id="rId5" imgW="533169" imgH="228501" progId="Equation.DSMT4">
+                  <p:oleObj name="Equation" r:id="rId10" imgW="533169" imgH="228501" progId="Equation.DSMT4">
                     <p:embed/>
                     <p:pic>
                       <p:nvPicPr>
@@ -7164,7 +7153,7 @@
                         <p:nvPr/>
                       </p:nvPicPr>
                       <p:blipFill>
-                        <a:blip r:embed="rId6">
+                        <a:blip r:embed="rId8">
                           <a:extLst>
                             <a:ext uri="{28A0092B-C50C-407E-A947-70E740481C1C}">
                               <a14:useLocalDpi xmlns:a14="http://schemas.microsoft.com/office/drawing/2010/main" val="0"/>
@@ -7230,7 +7219,7 @@
             <p:cNvPr id="11" name="Object 8">
               <a:extLst>
                 <a:ext uri="{FF2B5EF4-FFF2-40B4-BE49-F238E27FC236}">
-                  <a16:creationId xmlns:a16="http://schemas.microsoft.com/office/drawing/2014/main" id="{C6BE09FC-52A1-27C2-EDB7-7FB4119AE1E1}"/>
+                  <a16:creationId xmlns:a16="http://schemas.microsoft.com/office/drawing/2014/main" xmlns="" id="{C6BE09FC-52A1-27C2-EDB7-7FB4119AE1E1}"/>
                 </a:ext>
               </a:extLst>
             </p:cNvPr>
@@ -7247,12 +7236,12 @@
             <a:graphicData uri="http://schemas.openxmlformats.org/presentationml/2006/ole">
               <mc:AlternateContent xmlns:mc="http://schemas.openxmlformats.org/markup-compatibility/2006">
                 <mc:Choice xmlns:v="urn:schemas-microsoft-com:vml" Requires="v">
-                  <p:oleObj name="Equation" r:id="rId5" imgW="533169" imgH="228501" progId="Equation.DSMT4">
+                  <p:oleObj spid="_x0000_s1049" name="Equation" r:id="rId11" imgW="533169" imgH="228501" progId="Equation.DSMT4">
                     <p:embed/>
                   </p:oleObj>
                 </mc:Choice>
                 <mc:Fallback>
-                  <p:oleObj name="Equation" r:id="rId5" imgW="533169" imgH="228501" progId="Equation.DSMT4">
+                  <p:oleObj name="Equation" r:id="rId11" imgW="533169" imgH="228501" progId="Equation.DSMT4">
                     <p:embed/>
                     <p:pic>
                       <p:nvPicPr>
@@ -7263,7 +7252,7 @@
                         <p:nvPr/>
                       </p:nvPicPr>
                       <p:blipFill>
-                        <a:blip r:embed="rId6">
+                        <a:blip r:embed="rId8">
                           <a:extLst>
                             <a:ext uri="{28A0092B-C50C-407E-A947-70E740481C1C}">
                               <a14:useLocalDpi xmlns:a14="http://schemas.microsoft.com/office/drawing/2010/main" val="0"/>
@@ -7330,7 +7319,7 @@
           <p:cNvPr id="18" name="TextBox 17">
             <a:extLst>
               <a:ext uri="{FF2B5EF4-FFF2-40B4-BE49-F238E27FC236}">
-                <a16:creationId xmlns:a16="http://schemas.microsoft.com/office/drawing/2014/main" id="{FE04B372-2A53-E563-4ABC-14DF8D382AC1}"/>
+                <a16:creationId xmlns:a16="http://schemas.microsoft.com/office/drawing/2014/main" xmlns="" id="{FE04B372-2A53-E563-4ABC-14DF8D382AC1}"/>
               </a:ext>
             </a:extLst>
           </p:cNvPr>
@@ -7377,7 +7366,7 @@
           <p:cNvPr id="19" name="TextBox 18">
             <a:extLst>
               <a:ext uri="{FF2B5EF4-FFF2-40B4-BE49-F238E27FC236}">
-                <a16:creationId xmlns:a16="http://schemas.microsoft.com/office/drawing/2014/main" id="{053FD7A4-9E53-C0D7-0C71-5164A5A6B55B}"/>
+                <a16:creationId xmlns:a16="http://schemas.microsoft.com/office/drawing/2014/main" xmlns="" id="{053FD7A4-9E53-C0D7-0C71-5164A5A6B55B}"/>
               </a:ext>
             </a:extLst>
           </p:cNvPr>
@@ -7450,7 +7439,7 @@
           <p:cNvPr id="20" name="TextBox 19">
             <a:extLst>
               <a:ext uri="{FF2B5EF4-FFF2-40B4-BE49-F238E27FC236}">
-                <a16:creationId xmlns:a16="http://schemas.microsoft.com/office/drawing/2014/main" id="{016F158E-1431-4C8C-A2D4-57AB6EB892E3}"/>
+                <a16:creationId xmlns:a16="http://schemas.microsoft.com/office/drawing/2014/main" xmlns="" id="{016F158E-1431-4C8C-A2D4-57AB6EB892E3}"/>
               </a:ext>
             </a:extLst>
           </p:cNvPr>
@@ -7523,7 +7512,7 @@
           <p:cNvPr id="21" name="TextBox 20">
             <a:extLst>
               <a:ext uri="{FF2B5EF4-FFF2-40B4-BE49-F238E27FC236}">
-                <a16:creationId xmlns:a16="http://schemas.microsoft.com/office/drawing/2014/main" id="{2513E5F1-81A6-FEB2-C858-6D6471814542}"/>
+                <a16:creationId xmlns:a16="http://schemas.microsoft.com/office/drawing/2014/main" xmlns="" id="{2513E5F1-81A6-FEB2-C858-6D6471814542}"/>
               </a:ext>
             </a:extLst>
           </p:cNvPr>
@@ -7637,31 +7626,6 @@
       </p:grpSpPr>
       <p:sp>
         <p:nvSpPr>
-          <p:cNvPr id="3" name="Text Placeholder 2">
-            <a:extLst>
-              <a:ext uri="{FF2B5EF4-FFF2-40B4-BE49-F238E27FC236}">
-                <a16:creationId xmlns:a16="http://schemas.microsoft.com/office/drawing/2014/main" id="{8159356E-BFD3-4EB3-D5BF-E90BF976F23E}"/>
-              </a:ext>
-            </a:extLst>
-          </p:cNvPr>
-          <p:cNvSpPr>
-            <a:spLocks noGrp="1"/>
-          </p:cNvSpPr>
-          <p:nvPr>
-            <p:ph type="body" idx="1"/>
-          </p:nvPr>
-        </p:nvSpPr>
-        <p:spPr/>
-        <p:txBody>
-          <a:bodyPr/>
-          <a:lstStyle/>
-          <a:p>
-            <a:endParaRPr lang="en-GB"/>
-          </a:p>
-        </p:txBody>
-      </p:sp>
-      <p:sp>
-        <p:nvSpPr>
           <p:cNvPr id="2" name="Title 1"/>
           <p:cNvSpPr>
             <a:spLocks noGrp="1"/>
@@ -7679,7 +7643,7 @@
             <a:r>
               <a:rPr lang="en-US" sz="4000" b="1" dirty="0">
                 <a:solidFill>
-                  <a:srgbClr val="0033CC"/>
+                  <a:srgbClr val="00B050"/>
                 </a:solidFill>
                 <a:latin typeface="Cambria" panose="02040503050406030204" pitchFamily="18" charset="0"/>
                 <a:ea typeface="Cambria" panose="02040503050406030204" pitchFamily="18" charset="0"/>
@@ -7694,7 +7658,7 @@
           <p:cNvPr id="6" name="TextBox 5">
             <a:extLst>
               <a:ext uri="{FF2B5EF4-FFF2-40B4-BE49-F238E27FC236}">
-                <a16:creationId xmlns:a16="http://schemas.microsoft.com/office/drawing/2014/main" id="{0654FFA1-83B2-4453-ACA6-EE445F0C37D9}"/>
+                <a16:creationId xmlns:a16="http://schemas.microsoft.com/office/drawing/2014/main" xmlns="" id="{0654FFA1-83B2-4453-ACA6-EE445F0C37D9}"/>
               </a:ext>
             </a:extLst>
           </p:cNvPr>
@@ -7813,31 +7777,6 @@
       </p:grpSpPr>
       <p:sp>
         <p:nvSpPr>
-          <p:cNvPr id="3" name="Text Placeholder 2">
-            <a:extLst>
-              <a:ext uri="{FF2B5EF4-FFF2-40B4-BE49-F238E27FC236}">
-                <a16:creationId xmlns:a16="http://schemas.microsoft.com/office/drawing/2014/main" id="{664937BF-9C28-84D6-BA4D-35E8D51B5B9C}"/>
-              </a:ext>
-            </a:extLst>
-          </p:cNvPr>
-          <p:cNvSpPr>
-            <a:spLocks noGrp="1"/>
-          </p:cNvSpPr>
-          <p:nvPr>
-            <p:ph type="body" idx="1"/>
-          </p:nvPr>
-        </p:nvSpPr>
-        <p:spPr/>
-        <p:txBody>
-          <a:bodyPr/>
-          <a:lstStyle/>
-          <a:p>
-            <a:endParaRPr lang="en-GB"/>
-          </a:p>
-        </p:txBody>
-      </p:sp>
-      <p:sp>
-        <p:nvSpPr>
           <p:cNvPr id="2" name="Title 1"/>
           <p:cNvSpPr>
             <a:spLocks noGrp="1"/>
@@ -7855,7 +7794,7 @@
             <a:r>
               <a:rPr lang="en-US" sz="4000" b="1" dirty="0">
                 <a:solidFill>
-                  <a:srgbClr val="0033CC"/>
+                  <a:srgbClr val="00B050"/>
                 </a:solidFill>
                 <a:latin typeface="Cambria" panose="02040503050406030204" pitchFamily="18" charset="0"/>
                 <a:ea typeface="Cambria" panose="02040503050406030204" pitchFamily="18" charset="0"/>
@@ -7870,7 +7809,7 @@
           <p:cNvPr id="6" name="TextBox 5">
             <a:extLst>
               <a:ext uri="{FF2B5EF4-FFF2-40B4-BE49-F238E27FC236}">
-                <a16:creationId xmlns:a16="http://schemas.microsoft.com/office/drawing/2014/main" id="{0654FFA1-83B2-4453-ACA6-EE445F0C37D9}"/>
+                <a16:creationId xmlns:a16="http://schemas.microsoft.com/office/drawing/2014/main" xmlns="" id="{0654FFA1-83B2-4453-ACA6-EE445F0C37D9}"/>
               </a:ext>
             </a:extLst>
           </p:cNvPr>
@@ -7973,7 +7912,7 @@
           <p:cNvPr id="18" name="TextBox 17">
             <a:extLst>
               <a:ext uri="{FF2B5EF4-FFF2-40B4-BE49-F238E27FC236}">
-                <a16:creationId xmlns:a16="http://schemas.microsoft.com/office/drawing/2014/main" id="{FE04B372-2A53-E563-4ABC-14DF8D382AC1}"/>
+                <a16:creationId xmlns:a16="http://schemas.microsoft.com/office/drawing/2014/main" xmlns="" id="{FE04B372-2A53-E563-4ABC-14DF8D382AC1}"/>
               </a:ext>
             </a:extLst>
           </p:cNvPr>
@@ -8020,7 +7959,7 @@
           <p:cNvPr id="17" name="Picture 16">
             <a:extLst>
               <a:ext uri="{FF2B5EF4-FFF2-40B4-BE49-F238E27FC236}">
-                <a16:creationId xmlns:a16="http://schemas.microsoft.com/office/drawing/2014/main" id="{AC03B666-5E84-A43C-5E7B-0B1A6C60E884}"/>
+                <a16:creationId xmlns:a16="http://schemas.microsoft.com/office/drawing/2014/main" xmlns="" id="{AC03B666-5E84-A43C-5E7B-0B1A6C60E884}"/>
               </a:ext>
             </a:extLst>
           </p:cNvPr>
@@ -8050,7 +7989,7 @@
           <p:cNvPr id="24" name="TextBox 23">
             <a:extLst>
               <a:ext uri="{FF2B5EF4-FFF2-40B4-BE49-F238E27FC236}">
-                <a16:creationId xmlns:a16="http://schemas.microsoft.com/office/drawing/2014/main" id="{E6125C5B-05B9-77EF-9D24-85614046A70A}"/>
+                <a16:creationId xmlns:a16="http://schemas.microsoft.com/office/drawing/2014/main" xmlns="" id="{E6125C5B-05B9-77EF-9D24-85614046A70A}"/>
               </a:ext>
             </a:extLst>
           </p:cNvPr>
@@ -8097,7 +8036,7 @@
           <p:cNvPr id="25" name="TextBox 24">
             <a:extLst>
               <a:ext uri="{FF2B5EF4-FFF2-40B4-BE49-F238E27FC236}">
-                <a16:creationId xmlns:a16="http://schemas.microsoft.com/office/drawing/2014/main" id="{ACA18259-5B2E-9E0A-EAA8-71444FEF09D7}"/>
+                <a16:creationId xmlns:a16="http://schemas.microsoft.com/office/drawing/2014/main" xmlns="" id="{ACA18259-5B2E-9E0A-EAA8-71444FEF09D7}"/>
               </a:ext>
             </a:extLst>
           </p:cNvPr>
@@ -8171,31 +8110,6 @@
       </p:grpSpPr>
       <p:sp>
         <p:nvSpPr>
-          <p:cNvPr id="3" name="Text Placeholder 2">
-            <a:extLst>
-              <a:ext uri="{FF2B5EF4-FFF2-40B4-BE49-F238E27FC236}">
-                <a16:creationId xmlns:a16="http://schemas.microsoft.com/office/drawing/2014/main" id="{3D81DC6D-AACF-E210-BD28-BC5A1C2BA450}"/>
-              </a:ext>
-            </a:extLst>
-          </p:cNvPr>
-          <p:cNvSpPr>
-            <a:spLocks noGrp="1"/>
-          </p:cNvSpPr>
-          <p:nvPr>
-            <p:ph type="body" idx="1"/>
-          </p:nvPr>
-        </p:nvSpPr>
-        <p:spPr/>
-        <p:txBody>
-          <a:bodyPr/>
-          <a:lstStyle/>
-          <a:p>
-            <a:endParaRPr lang="en-GB"/>
-          </a:p>
-        </p:txBody>
-      </p:sp>
-      <p:sp>
-        <p:nvSpPr>
           <p:cNvPr id="2" name="Title 1"/>
           <p:cNvSpPr>
             <a:spLocks noGrp="1"/>
@@ -8213,7 +8127,7 @@
             <a:r>
               <a:rPr lang="en-US" sz="4000" b="1" dirty="0">
                 <a:solidFill>
-                  <a:srgbClr val="0033CC"/>
+                  <a:srgbClr val="00B050"/>
                 </a:solidFill>
                 <a:latin typeface="Cambria" panose="02040503050406030204" pitchFamily="18" charset="0"/>
                 <a:ea typeface="Cambria" panose="02040503050406030204" pitchFamily="18" charset="0"/>
@@ -8228,7 +8142,7 @@
           <p:cNvPr id="6" name="TextBox 5">
             <a:extLst>
               <a:ext uri="{FF2B5EF4-FFF2-40B4-BE49-F238E27FC236}">
-                <a16:creationId xmlns:a16="http://schemas.microsoft.com/office/drawing/2014/main" id="{0654FFA1-83B2-4453-ACA6-EE445F0C37D9}"/>
+                <a16:creationId xmlns:a16="http://schemas.microsoft.com/office/drawing/2014/main" xmlns="" id="{0654FFA1-83B2-4453-ACA6-EE445F0C37D9}"/>
               </a:ext>
             </a:extLst>
           </p:cNvPr>
@@ -8299,7 +8213,7 @@
           <p:cNvPr id="18" name="TextBox 17">
             <a:extLst>
               <a:ext uri="{FF2B5EF4-FFF2-40B4-BE49-F238E27FC236}">
-                <a16:creationId xmlns:a16="http://schemas.microsoft.com/office/drawing/2014/main" id="{FE04B372-2A53-E563-4ABC-14DF8D382AC1}"/>
+                <a16:creationId xmlns:a16="http://schemas.microsoft.com/office/drawing/2014/main" xmlns="" id="{FE04B372-2A53-E563-4ABC-14DF8D382AC1}"/>
               </a:ext>
             </a:extLst>
           </p:cNvPr>
@@ -8346,7 +8260,7 @@
           <p:cNvPr id="9" name="Picture 8">
             <a:extLst>
               <a:ext uri="{FF2B5EF4-FFF2-40B4-BE49-F238E27FC236}">
-                <a16:creationId xmlns:a16="http://schemas.microsoft.com/office/drawing/2014/main" id="{D2ED08F8-3BBA-8D06-1653-7969FEFC109C}"/>
+                <a16:creationId xmlns:a16="http://schemas.microsoft.com/office/drawing/2014/main" xmlns="" id="{D2ED08F8-3BBA-8D06-1653-7969FEFC109C}"/>
               </a:ext>
             </a:extLst>
           </p:cNvPr>
@@ -8922,13 +8836,28 @@
   <a:extraClrSchemeLst/>
   <a:extLst>
     <a:ext uri="{05A4C25C-085E-4340-85A3-A5531E510DB2}">
-      <thm15:themeFamily xmlns:thm15="http://schemas.microsoft.com/office/thememl/2012/main" name="Office Theme" id="{62F939B6-93AF-4DB8-9C6B-D6C7DFDC589F}" vid="{4A3C46E8-61CC-4603-A589-7422A47A8E4A}"/>
+      <thm15:themeFamily xmlns:thm15="http://schemas.microsoft.com/office/thememl/2012/main" xmlns="" name="Office Theme" id="{62F939B6-93AF-4DB8-9C6B-D6C7DFDC589F}" vid="{4A3C46E8-61CC-4603-A589-7422A47A8E4A}"/>
     </a:ext>
   </a:extLst>
 </a:theme>
 </file>
 
 <file path=customXml/item1.xml><?xml version="1.0" encoding="utf-8"?>
+<p:properties xmlns:p="http://schemas.microsoft.com/office/2006/metadata/properties" xmlns:xsi="http://www.w3.org/2001/XMLSchema-instance" xmlns:pc="http://schemas.microsoft.com/office/infopath/2007/PartnerControls">
+  <documentManagement/>
+</p:properties>
+</file>
+
+<file path=customXml/item2.xml><?xml version="1.0" encoding="utf-8"?>
+<?mso-contentType ?>
+<FormTemplates xmlns="http://schemas.microsoft.com/sharepoint/v3/contenttype/forms">
+  <Display>DocumentLibraryForm</Display>
+  <Edit>DocumentLibraryForm</Edit>
+  <New>DocumentLibraryForm</New>
+</FormTemplates>
+</file>
+
+<file path=customXml/item3.xml><?xml version="1.0" encoding="utf-8"?>
 <ct:contentTypeSchema xmlns:ct="http://schemas.microsoft.com/office/2006/metadata/contentType" xmlns:ma="http://schemas.microsoft.com/office/2006/metadata/properties/metaAttributes" ct:_="" ma:_="" ma:contentTypeName="Document" ma:contentTypeID="0x0101003CEF3BD1EF635A4F97BD51F1E51B0878" ma:contentTypeVersion="2" ma:contentTypeDescription="Create a new document." ma:contentTypeScope="" ma:versionID="672dfe26081b3bc98f10315b3a22dcbc">
   <xsd:schema xmlns:xsd="http://www.w3.org/2001/XMLSchema" xmlns:xs="http://www.w3.org/2001/XMLSchema" xmlns:p="http://schemas.microsoft.com/office/2006/metadata/properties" xmlns:ns2="a369faee-33c0-4fdb-9614-7992bb34146d" targetNamespace="http://schemas.microsoft.com/office/2006/metadata/properties" ma:root="true" ma:fieldsID="cbb7ef1bc973bb7ecbf9a0148f98967d" ns2:_="">
     <xsd:import namespace="a369faee-33c0-4fdb-9614-7992bb34146d"/>
@@ -9060,22 +8989,31 @@
 </ct:contentTypeSchema>
 </file>
 
-<file path=customXml/item2.xml><?xml version="1.0" encoding="utf-8"?>
-<?mso-contentType ?>
-<FormTemplates xmlns="http://schemas.microsoft.com/sharepoint/v3/contenttype/forms">
-  <Display>DocumentLibraryForm</Display>
-  <Edit>DocumentLibraryForm</Edit>
-  <New>DocumentLibraryForm</New>
-</FormTemplates>
+<file path=customXml/itemProps1.xml><?xml version="1.0" encoding="utf-8"?>
+<ds:datastoreItem xmlns:ds="http://schemas.openxmlformats.org/officeDocument/2006/customXml" ds:itemID="{58F0AA1E-8E89-4A9D-B1A6-D9111EEE5315}">
+  <ds:schemaRefs>
+    <ds:schemaRef ds:uri="http://purl.org/dc/terms/"/>
+    <ds:schemaRef ds:uri="http://schemas.microsoft.com/office/2006/documentManagement/types"/>
+    <ds:schemaRef ds:uri="http://schemas.microsoft.com/office/2006/metadata/properties"/>
+    <ds:schemaRef ds:uri="http://www.w3.org/XML/1998/namespace"/>
+    <ds:schemaRef ds:uri="http://purl.org/dc/elements/1.1/"/>
+    <ds:schemaRef ds:uri="http://schemas.openxmlformats.org/package/2006/metadata/core-properties"/>
+    <ds:schemaRef ds:uri="http://purl.org/dc/dcmitype/"/>
+    <ds:schemaRef ds:uri="http://schemas.microsoft.com/office/infopath/2007/PartnerControls"/>
+    <ds:schemaRef ds:uri="a369faee-33c0-4fdb-9614-7992bb34146d"/>
+  </ds:schemaRefs>
+</ds:datastoreItem>
 </file>
 
-<file path=customXml/item3.xml><?xml version="1.0" encoding="utf-8"?>
-<p:properties xmlns:p="http://schemas.microsoft.com/office/2006/metadata/properties" xmlns:xsi="http://www.w3.org/2001/XMLSchema-instance" xmlns:pc="http://schemas.microsoft.com/office/infopath/2007/PartnerControls">
-  <documentManagement/>
-</p:properties>
+<file path=customXml/itemProps2.xml><?xml version="1.0" encoding="utf-8"?>
+<ds:datastoreItem xmlns:ds="http://schemas.openxmlformats.org/officeDocument/2006/customXml" ds:itemID="{521843C9-2E02-4BEA-BC3B-C5EFE55AFC14}">
+  <ds:schemaRefs>
+    <ds:schemaRef ds:uri="http://schemas.microsoft.com/sharepoint/v3/contenttype/forms"/>
+  </ds:schemaRefs>
+</ds:datastoreItem>
 </file>
 
-<file path=customXml/itemProps1.xml><?xml version="1.0" encoding="utf-8"?>
+<file path=customXml/itemProps3.xml><?xml version="1.0" encoding="utf-8"?>
 <ds:datastoreItem xmlns:ds="http://schemas.openxmlformats.org/officeDocument/2006/customXml" ds:itemID="{A5636107-D898-4101-B59E-59A9A37B7ABF}">
   <ds:schemaRefs>
     <ds:schemaRef ds:uri="http://schemas.microsoft.com/office/2006/metadata/contentType"/>
@@ -9091,28 +9029,4 @@
     <ds:schemaRef ds:uri="http://schemas.microsoft.com/internal/obd"/>
   </ds:schemaRefs>
 </ds:datastoreItem>
-</file>
-
-<file path=customXml/itemProps2.xml><?xml version="1.0" encoding="utf-8"?>
-<ds:datastoreItem xmlns:ds="http://schemas.openxmlformats.org/officeDocument/2006/customXml" ds:itemID="{521843C9-2E02-4BEA-BC3B-C5EFE55AFC14}">
-  <ds:schemaRefs>
-    <ds:schemaRef ds:uri="http://schemas.microsoft.com/sharepoint/v3/contenttype/forms"/>
-  </ds:schemaRefs>
-</ds:datastoreItem>
-</file>
-
-<file path=customXml/itemProps3.xml><?xml version="1.0" encoding="utf-8"?>
-<ds:datastoreItem xmlns:ds="http://schemas.openxmlformats.org/officeDocument/2006/customXml" ds:itemID="{58F0AA1E-8E89-4A9D-B1A6-D9111EEE5315}">
-  <ds:schemaRefs>
-    <ds:schemaRef ds:uri="http://purl.org/dc/terms/"/>
-    <ds:schemaRef ds:uri="http://schemas.microsoft.com/office/2006/documentManagement/types"/>
-    <ds:schemaRef ds:uri="http://schemas.microsoft.com/office/2006/metadata/properties"/>
-    <ds:schemaRef ds:uri="http://www.w3.org/XML/1998/namespace"/>
-    <ds:schemaRef ds:uri="http://purl.org/dc/elements/1.1/"/>
-    <ds:schemaRef ds:uri="http://schemas.openxmlformats.org/package/2006/metadata/core-properties"/>
-    <ds:schemaRef ds:uri="http://purl.org/dc/dcmitype/"/>
-    <ds:schemaRef ds:uri="http://schemas.microsoft.com/office/infopath/2007/PartnerControls"/>
-    <ds:schemaRef ds:uri="a369faee-33c0-4fdb-9614-7992bb34146d"/>
-  </ds:schemaRefs>
-</ds:datastoreItem>
 </file>
</xml_diff>